<commit_message>
dev: yolov7/loss: study yolo loss
</commit_message>
<xml_diff>
--- a/yolov7/doc/networks.pptx
+++ b/yolov7/doc/networks.pptx
@@ -19,6 +19,8 @@
     <p:sldId id="268" r:id="rId13"/>
     <p:sldId id="269" r:id="rId14"/>
     <p:sldId id="270" r:id="rId15"/>
+    <p:sldId id="271" r:id="rId16"/>
+    <p:sldId id="272" r:id="rId17"/>
   </p:sldIdLst>
   <p:sldSz cx="12192000" cy="6858000"/>
   <p:notesSz cx="6858000" cy="9144000"/>
@@ -117,6 +119,11 @@
       </a:defRPr>
     </a:lvl9pPr>
   </p:defaultTextStyle>
+  <p:extLst>
+    <p:ext uri="{EFAFB233-063F-42B5-8137-9DF3F51BA10A}">
+      <p15:sldGuideLst xmlns:p15="http://schemas.microsoft.com/office/powerpoint/2012/main"/>
+    </p:ext>
+  </p:extLst>
 </p:presentation>
 </file>
 
@@ -267,7 +274,7 @@
           <a:p>
             <a:fld id="{D8F2F205-24F8-4489-8B05-D7769DC60EDD}" type="datetimeFigureOut">
               <a:rPr lang="en-US" smtClean="0"/>
-              <a:t>9/10/2025</a:t>
+              <a:t>9/17/2025</a:t>
             </a:fld>
             <a:endParaRPr lang="en-US"/>
           </a:p>
@@ -465,7 +472,7 @@
           <a:p>
             <a:fld id="{D8F2F205-24F8-4489-8B05-D7769DC60EDD}" type="datetimeFigureOut">
               <a:rPr lang="en-US" smtClean="0"/>
-              <a:t>9/10/2025</a:t>
+              <a:t>9/17/2025</a:t>
             </a:fld>
             <a:endParaRPr lang="en-US"/>
           </a:p>
@@ -673,7 +680,7 @@
           <a:p>
             <a:fld id="{D8F2F205-24F8-4489-8B05-D7769DC60EDD}" type="datetimeFigureOut">
               <a:rPr lang="en-US" smtClean="0"/>
-              <a:t>9/10/2025</a:t>
+              <a:t>9/17/2025</a:t>
             </a:fld>
             <a:endParaRPr lang="en-US"/>
           </a:p>
@@ -871,7 +878,7 @@
           <a:p>
             <a:fld id="{D8F2F205-24F8-4489-8B05-D7769DC60EDD}" type="datetimeFigureOut">
               <a:rPr lang="en-US" smtClean="0"/>
-              <a:t>9/10/2025</a:t>
+              <a:t>9/17/2025</a:t>
             </a:fld>
             <a:endParaRPr lang="en-US"/>
           </a:p>
@@ -1146,7 +1153,7 @@
           <a:p>
             <a:fld id="{D8F2F205-24F8-4489-8B05-D7769DC60EDD}" type="datetimeFigureOut">
               <a:rPr lang="en-US" smtClean="0"/>
-              <a:t>9/10/2025</a:t>
+              <a:t>9/17/2025</a:t>
             </a:fld>
             <a:endParaRPr lang="en-US"/>
           </a:p>
@@ -1411,7 +1418,7 @@
           <a:p>
             <a:fld id="{D8F2F205-24F8-4489-8B05-D7769DC60EDD}" type="datetimeFigureOut">
               <a:rPr lang="en-US" smtClean="0"/>
-              <a:t>9/10/2025</a:t>
+              <a:t>9/17/2025</a:t>
             </a:fld>
             <a:endParaRPr lang="en-US"/>
           </a:p>
@@ -1823,7 +1830,7 @@
           <a:p>
             <a:fld id="{D8F2F205-24F8-4489-8B05-D7769DC60EDD}" type="datetimeFigureOut">
               <a:rPr lang="en-US" smtClean="0"/>
-              <a:t>9/10/2025</a:t>
+              <a:t>9/17/2025</a:t>
             </a:fld>
             <a:endParaRPr lang="en-US"/>
           </a:p>
@@ -1964,7 +1971,7 @@
           <a:p>
             <a:fld id="{D8F2F205-24F8-4489-8B05-D7769DC60EDD}" type="datetimeFigureOut">
               <a:rPr lang="en-US" smtClean="0"/>
-              <a:t>9/10/2025</a:t>
+              <a:t>9/17/2025</a:t>
             </a:fld>
             <a:endParaRPr lang="en-US"/>
           </a:p>
@@ -2077,7 +2084,7 @@
           <a:p>
             <a:fld id="{D8F2F205-24F8-4489-8B05-D7769DC60EDD}" type="datetimeFigureOut">
               <a:rPr lang="en-US" smtClean="0"/>
-              <a:t>9/10/2025</a:t>
+              <a:t>9/17/2025</a:t>
             </a:fld>
             <a:endParaRPr lang="en-US"/>
           </a:p>
@@ -2388,7 +2395,7 @@
           <a:p>
             <a:fld id="{D8F2F205-24F8-4489-8B05-D7769DC60EDD}" type="datetimeFigureOut">
               <a:rPr lang="en-US" smtClean="0"/>
-              <a:t>9/10/2025</a:t>
+              <a:t>9/17/2025</a:t>
             </a:fld>
             <a:endParaRPr lang="en-US"/>
           </a:p>
@@ -2676,7 +2683,7 @@
           <a:p>
             <a:fld id="{D8F2F205-24F8-4489-8B05-D7769DC60EDD}" type="datetimeFigureOut">
               <a:rPr lang="en-US" smtClean="0"/>
-              <a:t>9/10/2025</a:t>
+              <a:t>9/17/2025</a:t>
             </a:fld>
             <a:endParaRPr lang="en-US"/>
           </a:p>
@@ -2917,7 +2924,7 @@
           <a:p>
             <a:fld id="{D8F2F205-24F8-4489-8B05-D7769DC60EDD}" type="datetimeFigureOut">
               <a:rPr lang="en-US" smtClean="0"/>
-              <a:t>9/10/2025</a:t>
+              <a:t>9/17/2025</a:t>
             </a:fld>
             <a:endParaRPr lang="en-US"/>
           </a:p>
@@ -3445,8 +3452,8 @@
           </a:p>
         </p:txBody>
       </p:sp>
-      <mc:AlternateContent xmlns:mc="http://schemas.openxmlformats.org/markup-compatibility/2006">
-        <mc:Choice xmlns:a14="http://schemas.microsoft.com/office/drawing/2010/main" Requires="a14">
+      <mc:AlternateContent xmlns:mc="http://schemas.openxmlformats.org/markup-compatibility/2006" xmlns:a14="http://schemas.microsoft.com/office/drawing/2010/main">
+        <mc:Choice Requires="a14">
           <p:sp>
             <p:nvSpPr>
               <p:cNvPr id="5" name="TextBox 4">
@@ -4250,7 +4257,7 @@
             </p:txBody>
           </p:sp>
         </mc:Choice>
-        <mc:Fallback>
+        <mc:Fallback xmlns="">
           <p:sp>
             <p:nvSpPr>
               <p:cNvPr id="5" name="TextBox 4">
@@ -5574,8 +5581,8 @@
           </a:p>
         </p:txBody>
       </p:sp>
-      <mc:AlternateContent xmlns:mc="http://schemas.openxmlformats.org/markup-compatibility/2006">
-        <mc:Choice xmlns:a14="http://schemas.microsoft.com/office/drawing/2010/main" Requires="a14">
+      <mc:AlternateContent xmlns:mc="http://schemas.openxmlformats.org/markup-compatibility/2006" xmlns:a14="http://schemas.microsoft.com/office/drawing/2010/main">
+        <mc:Choice Requires="a14">
           <p:sp>
             <p:nvSpPr>
               <p:cNvPr id="5" name="TextBox 4">
@@ -5786,7 +5793,7 @@
             </p:txBody>
           </p:sp>
         </mc:Choice>
-        <mc:Fallback>
+        <mc:Fallback xmlns="">
           <p:sp>
             <p:nvSpPr>
               <p:cNvPr id="5" name="TextBox 4">
@@ -6341,8 +6348,8 @@
           </a:graphicData>
         </a:graphic>
       </p:graphicFrame>
-      <mc:AlternateContent xmlns:mc="http://schemas.openxmlformats.org/markup-compatibility/2006">
-        <mc:Choice xmlns:a14="http://schemas.microsoft.com/office/drawing/2010/main" Requires="a14">
+      <mc:AlternateContent xmlns:mc="http://schemas.openxmlformats.org/markup-compatibility/2006" xmlns:a14="http://schemas.microsoft.com/office/drawing/2010/main">
+        <mc:Choice Requires="a14">
           <p:sp>
             <p:nvSpPr>
               <p:cNvPr id="7" name="TextBox 6">
@@ -6371,6 +6378,7 @@
               </a:bodyPr>
               <a:lstStyle/>
               <a:p>
+                <a:pPr/>
                 <a14:m>
                   <m:oMathPara xmlns:m="http://schemas.openxmlformats.org/officeDocument/2006/math">
                     <m:oMathParaPr>
@@ -6434,7 +6442,7 @@
             </p:txBody>
           </p:sp>
         </mc:Choice>
-        <mc:Fallback>
+        <mc:Fallback xmlns="">
           <p:sp>
             <p:nvSpPr>
               <p:cNvPr id="7" name="TextBox 6">
@@ -9038,8 +9046,8 @@
           </a:graphicData>
         </a:graphic>
       </p:graphicFrame>
-      <mc:AlternateContent xmlns:mc="http://schemas.openxmlformats.org/markup-compatibility/2006">
-        <mc:Choice xmlns:a14="http://schemas.microsoft.com/office/drawing/2010/main" Requires="a14">
+      <mc:AlternateContent xmlns:mc="http://schemas.openxmlformats.org/markup-compatibility/2006" xmlns:a14="http://schemas.microsoft.com/office/drawing/2010/main">
+        <mc:Choice Requires="a14">
           <p:sp>
             <p:nvSpPr>
               <p:cNvPr id="19" name="TextBox 18">
@@ -9419,7 +9427,7 @@
             </p:txBody>
           </p:sp>
         </mc:Choice>
-        <mc:Fallback>
+        <mc:Fallback xmlns="">
           <p:sp>
             <p:nvSpPr>
               <p:cNvPr id="19" name="TextBox 18">
@@ -11878,8 +11886,8 @@
           </p:txBody>
         </p:sp>
       </p:grpSp>
-      <mc:AlternateContent xmlns:mc="http://schemas.openxmlformats.org/markup-compatibility/2006">
-        <mc:Choice xmlns:a14="http://schemas.microsoft.com/office/drawing/2010/main" Requires="a14">
+      <mc:AlternateContent xmlns:mc="http://schemas.openxmlformats.org/markup-compatibility/2006" xmlns:a14="http://schemas.microsoft.com/office/drawing/2010/main">
+        <mc:Choice Requires="a14">
           <p:sp>
             <p:nvSpPr>
               <p:cNvPr id="70" name="TextBox 69">
@@ -11908,6 +11916,7 @@
               </a:bodyPr>
               <a:lstStyle/>
               <a:p>
+                <a:pPr/>
                 <a14:m>
                   <m:oMathPara xmlns:m="http://schemas.openxmlformats.org/officeDocument/2006/math">
                     <m:oMathParaPr>
@@ -11973,6 +11982,7 @@
                 </a:endParaRPr>
               </a:p>
               <a:p>
+                <a:pPr/>
                 <a14:m>
                   <m:oMathPara xmlns:m="http://schemas.openxmlformats.org/officeDocument/2006/math">
                     <m:oMathParaPr>
@@ -12030,7 +12040,7 @@
             </p:txBody>
           </p:sp>
         </mc:Choice>
-        <mc:Fallback>
+        <mc:Fallback xmlns="">
           <p:sp>
             <p:nvSpPr>
               <p:cNvPr id="70" name="TextBox 69">
@@ -12272,8 +12282,8 @@
           </a:p>
         </p:txBody>
       </p:sp>
-      <mc:AlternateContent xmlns:mc="http://schemas.openxmlformats.org/markup-compatibility/2006">
-        <mc:Choice xmlns:a14="http://schemas.microsoft.com/office/drawing/2010/main" Requires="a14">
+      <mc:AlternateContent xmlns:mc="http://schemas.openxmlformats.org/markup-compatibility/2006" xmlns:a14="http://schemas.microsoft.com/office/drawing/2010/main">
+        <mc:Choice Requires="a14">
           <p:sp>
             <p:nvSpPr>
               <p:cNvPr id="5" name="TextBox 4">
@@ -12587,19 +12597,7 @@
                       <a:rPr lang="en-US" b="0" i="1" smtClean="0">
                         <a:latin typeface="Cambria Math" panose="02040503050406030204" pitchFamily="18" charset="0"/>
                       </a:rPr>
-                      <m:t>−0.5</m:t>
-                    </m:r>
-                    <m:r>
-                      <a:rPr lang="en-US" b="0" i="1" smtClean="0">
-                        <a:latin typeface="Cambria Math" panose="02040503050406030204" pitchFamily="18" charset="0"/>
-                      </a:rPr>
-                      <m:t>≤</m:t>
-                    </m:r>
-                    <m:r>
-                      <a:rPr lang="en-US" b="0" i="1" smtClean="0">
-                        <a:latin typeface="Cambria Math" panose="02040503050406030204" pitchFamily="18" charset="0"/>
-                      </a:rPr>
-                      <m:t>1.5</m:t>
+                      <m:t>−0.5≤1.5</m:t>
                     </m:r>
                   </m:oMath>
                 </a14:m>
@@ -12922,7 +12920,7 @@
             </p:txBody>
           </p:sp>
         </mc:Choice>
-        <mc:Fallback>
+        <mc:Fallback xmlns="">
           <p:sp>
             <p:nvSpPr>
               <p:cNvPr id="5" name="TextBox 4">
@@ -14519,6 +14517,1260 @@
 </p:sld>
 </file>
 
+<file path=ppt/slides/slide15.xml><?xml version="1.0" encoding="utf-8"?>
+<p:sld xmlns:a="http://schemas.openxmlformats.org/drawingml/2006/main" xmlns:r="http://schemas.openxmlformats.org/officeDocument/2006/relationships" xmlns:p="http://schemas.openxmlformats.org/presentationml/2006/main">
+  <p:cSld>
+    <p:spTree>
+      <p:nvGrpSpPr>
+        <p:cNvPr id="1" name=""/>
+        <p:cNvGrpSpPr/>
+        <p:nvPr/>
+      </p:nvGrpSpPr>
+      <p:grpSpPr>
+        <a:xfrm>
+          <a:off x="0" y="0"/>
+          <a:ext cx="0" cy="0"/>
+          <a:chOff x="0" y="0"/>
+          <a:chExt cx="0" cy="0"/>
+        </a:xfrm>
+      </p:grpSpPr>
+      <p:sp>
+        <p:nvSpPr>
+          <p:cNvPr id="4" name="TextBox 3">
+            <a:extLst>
+              <a:ext uri="{FF2B5EF4-FFF2-40B4-BE49-F238E27FC236}">
+                <a16:creationId xmlns:a16="http://schemas.microsoft.com/office/drawing/2014/main" id="{5CFD2B9C-DEAE-6A98-060E-A77A9E1CD48C}"/>
+              </a:ext>
+            </a:extLst>
+          </p:cNvPr>
+          <p:cNvSpPr txBox="1"/>
+          <p:nvPr/>
+        </p:nvSpPr>
+        <p:spPr>
+          <a:xfrm>
+            <a:off x="508000" y="462103"/>
+            <a:ext cx="9613900" cy="523220"/>
+          </a:xfrm>
+          <a:prstGeom prst="rect">
+            <a:avLst/>
+          </a:prstGeom>
+          <a:noFill/>
+        </p:spPr>
+        <p:txBody>
+          <a:bodyPr wrap="square" rtlCol="0">
+            <a:spAutoFit/>
+          </a:bodyPr>
+          <a:lstStyle/>
+          <a:p>
+            <a:r>
+              <a:rPr lang="en-US" sz="2800" b="1" dirty="0"/>
+              <a:t>Input</a:t>
+            </a:r>
+          </a:p>
+        </p:txBody>
+      </p:sp>
+      <p:sp>
+        <p:nvSpPr>
+          <p:cNvPr id="5" name="TextBox 4">
+            <a:extLst>
+              <a:ext uri="{FF2B5EF4-FFF2-40B4-BE49-F238E27FC236}">
+                <a16:creationId xmlns:a16="http://schemas.microsoft.com/office/drawing/2014/main" id="{98D0150E-8941-AC99-5C64-38AA7F5F67A9}"/>
+              </a:ext>
+            </a:extLst>
+          </p:cNvPr>
+          <p:cNvSpPr txBox="1"/>
+          <p:nvPr/>
+        </p:nvSpPr>
+        <p:spPr>
+          <a:xfrm>
+            <a:off x="508000" y="985323"/>
+            <a:ext cx="10922000" cy="5184561"/>
+          </a:xfrm>
+          <a:prstGeom prst="rect">
+            <a:avLst/>
+          </a:prstGeom>
+          <a:noFill/>
+        </p:spPr>
+        <p:txBody>
+          <a:bodyPr wrap="square" rtlCol="0">
+            <a:spAutoFit/>
+          </a:bodyPr>
+          <a:lstStyle/>
+          <a:p>
+            <a:pPr>
+              <a:lnSpc>
+                <a:spcPct val="130000"/>
+              </a:lnSpc>
+            </a:pPr>
+            <a:r>
+              <a:rPr lang="en-US" dirty="0">
+                <a:latin typeface="Courier New" panose="02070309020205020404" pitchFamily="49" charset="0"/>
+                <a:cs typeface="Courier New" panose="02070309020205020404" pitchFamily="49" charset="0"/>
+              </a:rPr>
+              <a:t>image</a:t>
+            </a:r>
+            <a:r>
+              <a:rPr lang="en-US" dirty="0"/>
+              <a:t> is </a:t>
+            </a:r>
+            <a:r>
+              <a:rPr lang="en-US" dirty="0" err="1"/>
+              <a:t>BxCxHxW</a:t>
+            </a:r>
+            <a:r>
+              <a:rPr lang="en-US" dirty="0"/>
+              <a:t> uint8 tensor and normalized by /255 before passing to model</a:t>
+            </a:r>
+          </a:p>
+          <a:p>
+            <a:pPr>
+              <a:lnSpc>
+                <a:spcPct val="130000"/>
+              </a:lnSpc>
+            </a:pPr>
+            <a:r>
+              <a:rPr lang="en-US" dirty="0">
+                <a:latin typeface="Courier New" panose="02070309020205020404" pitchFamily="49" charset="0"/>
+                <a:cs typeface="Courier New" panose="02070309020205020404" pitchFamily="49" charset="0"/>
+              </a:rPr>
+              <a:t>target-label</a:t>
+            </a:r>
+            <a:r>
+              <a:rPr lang="en-US" dirty="0"/>
+              <a:t> is Bx6 where 6 is for </a:t>
+            </a:r>
+          </a:p>
+          <a:p>
+            <a:pPr algn="ctr">
+              <a:lnSpc>
+                <a:spcPct val="130000"/>
+              </a:lnSpc>
+              <a:spcBef>
+                <a:spcPts val="300"/>
+              </a:spcBef>
+              <a:spcAft>
+                <a:spcPts val="300"/>
+              </a:spcAft>
+            </a:pPr>
+            <a:r>
+              <a:rPr lang="en-US" dirty="0"/>
+              <a:t>  [</a:t>
+            </a:r>
+            <a:r>
+              <a:rPr lang="en-US" dirty="0">
+                <a:latin typeface="Courier New" panose="02070309020205020404" pitchFamily="49" charset="0"/>
+                <a:cs typeface="Courier New" panose="02070309020205020404" pitchFamily="49" charset="0"/>
+              </a:rPr>
+              <a:t>image-index, class, x</a:t>
+            </a:r>
+            <a:r>
+              <a:rPr lang="en-US" baseline="-25000" dirty="0">
+                <a:latin typeface="Courier New" panose="02070309020205020404" pitchFamily="49" charset="0"/>
+                <a:cs typeface="Courier New" panose="02070309020205020404" pitchFamily="49" charset="0"/>
+              </a:rPr>
+              <a:t>c</a:t>
+            </a:r>
+            <a:r>
+              <a:rPr lang="en-US" dirty="0">
+                <a:latin typeface="Courier New" panose="02070309020205020404" pitchFamily="49" charset="0"/>
+                <a:cs typeface="Courier New" panose="02070309020205020404" pitchFamily="49" charset="0"/>
+              </a:rPr>
+              <a:t>, </a:t>
+            </a:r>
+            <a:r>
+              <a:rPr lang="en-US" dirty="0" err="1">
+                <a:latin typeface="Courier New" panose="02070309020205020404" pitchFamily="49" charset="0"/>
+                <a:cs typeface="Courier New" panose="02070309020205020404" pitchFamily="49" charset="0"/>
+              </a:rPr>
+              <a:t>y</a:t>
+            </a:r>
+            <a:r>
+              <a:rPr lang="en-US" baseline="-25000" dirty="0" err="1">
+                <a:latin typeface="Courier New" panose="02070309020205020404" pitchFamily="49" charset="0"/>
+                <a:cs typeface="Courier New" panose="02070309020205020404" pitchFamily="49" charset="0"/>
+              </a:rPr>
+              <a:t>c</a:t>
+            </a:r>
+            <a:r>
+              <a:rPr lang="en-US" dirty="0">
+                <a:latin typeface="Courier New" panose="02070309020205020404" pitchFamily="49" charset="0"/>
+                <a:cs typeface="Courier New" panose="02070309020205020404" pitchFamily="49" charset="0"/>
+              </a:rPr>
+              <a:t>, w, h</a:t>
+            </a:r>
+            <a:r>
+              <a:rPr lang="en-US" dirty="0"/>
+              <a:t>]</a:t>
+            </a:r>
+          </a:p>
+          <a:p>
+            <a:pPr>
+              <a:lnSpc>
+                <a:spcPct val="130000"/>
+              </a:lnSpc>
+            </a:pPr>
+            <a:r>
+              <a:rPr lang="en-US" dirty="0">
+                <a:latin typeface="Courier New" panose="02070309020205020404" pitchFamily="49" charset="0"/>
+                <a:cs typeface="Courier New" panose="02070309020205020404" pitchFamily="49" charset="0"/>
+              </a:rPr>
+              <a:t>image-index</a:t>
+            </a:r>
+            <a:r>
+              <a:rPr lang="en-US" dirty="0"/>
+              <a:t>: indices with values in [0, batch-size)</a:t>
+            </a:r>
+          </a:p>
+          <a:p>
+            <a:pPr>
+              <a:lnSpc>
+                <a:spcPct val="130000"/>
+              </a:lnSpc>
+            </a:pPr>
+            <a:r>
+              <a:rPr lang="en-US" dirty="0">
+                <a:latin typeface="Courier New" panose="02070309020205020404" pitchFamily="49" charset="0"/>
+                <a:cs typeface="Courier New" panose="02070309020205020404" pitchFamily="49" charset="0"/>
+              </a:rPr>
+              <a:t>class</a:t>
+            </a:r>
+            <a:r>
+              <a:rPr lang="en-US" dirty="0"/>
+              <a:t>: labels with values in [0, N</a:t>
+            </a:r>
+            <a:r>
+              <a:rPr lang="en-US" baseline="-25000" dirty="0"/>
+              <a:t>c</a:t>
+            </a:r>
+            <a:r>
+              <a:rPr lang="en-US" dirty="0"/>
+              <a:t>) where N</a:t>
+            </a:r>
+            <a:r>
+              <a:rPr lang="en-US" baseline="-25000" dirty="0"/>
+              <a:t>c</a:t>
+            </a:r>
+            <a:r>
+              <a:rPr lang="en-US" dirty="0"/>
+              <a:t> is the number of class</a:t>
+            </a:r>
+          </a:p>
+          <a:p>
+            <a:pPr>
+              <a:lnSpc>
+                <a:spcPct val="130000"/>
+              </a:lnSpc>
+            </a:pPr>
+            <a:r>
+              <a:rPr lang="en-US" dirty="0">
+                <a:latin typeface="Courier New" panose="02070309020205020404" pitchFamily="49" charset="0"/>
+                <a:cs typeface="Courier New" panose="02070309020205020404" pitchFamily="49" charset="0"/>
+              </a:rPr>
+              <a:t>x</a:t>
+            </a:r>
+            <a:r>
+              <a:rPr lang="en-US" baseline="-25000" dirty="0">
+                <a:latin typeface="Courier New" panose="02070309020205020404" pitchFamily="49" charset="0"/>
+                <a:cs typeface="Courier New" panose="02070309020205020404" pitchFamily="49" charset="0"/>
+              </a:rPr>
+              <a:t>c</a:t>
+            </a:r>
+            <a:r>
+              <a:rPr lang="en-US" dirty="0">
+                <a:latin typeface="Courier New" panose="02070309020205020404" pitchFamily="49" charset="0"/>
+                <a:cs typeface="Courier New" panose="02070309020205020404" pitchFamily="49" charset="0"/>
+              </a:rPr>
+              <a:t> </a:t>
+            </a:r>
+            <a:r>
+              <a:rPr lang="en-US" dirty="0"/>
+              <a:t>: center of bounding box normalized by image width</a:t>
+            </a:r>
+          </a:p>
+          <a:p>
+            <a:pPr>
+              <a:lnSpc>
+                <a:spcPct val="130000"/>
+              </a:lnSpc>
+            </a:pPr>
+            <a:r>
+              <a:rPr lang="en-US" dirty="0" err="1">
+                <a:latin typeface="Courier New" panose="02070309020205020404" pitchFamily="49" charset="0"/>
+                <a:cs typeface="Courier New" panose="02070309020205020404" pitchFamily="49" charset="0"/>
+              </a:rPr>
+              <a:t>y</a:t>
+            </a:r>
+            <a:r>
+              <a:rPr lang="en-US" baseline="-25000" dirty="0" err="1">
+                <a:latin typeface="Courier New" panose="02070309020205020404" pitchFamily="49" charset="0"/>
+                <a:cs typeface="Courier New" panose="02070309020205020404" pitchFamily="49" charset="0"/>
+              </a:rPr>
+              <a:t>c</a:t>
+            </a:r>
+            <a:r>
+              <a:rPr lang="en-US" dirty="0"/>
+              <a:t> : center of bounding box normalized by image width</a:t>
+            </a:r>
+          </a:p>
+          <a:p>
+            <a:pPr>
+              <a:lnSpc>
+                <a:spcPct val="130000"/>
+              </a:lnSpc>
+            </a:pPr>
+            <a:r>
+              <a:rPr lang="en-US" dirty="0">
+                <a:latin typeface="Courier New" panose="02070309020205020404" pitchFamily="49" charset="0"/>
+                <a:cs typeface="Courier New" panose="02070309020205020404" pitchFamily="49" charset="0"/>
+              </a:rPr>
+              <a:t>w</a:t>
+            </a:r>
+            <a:r>
+              <a:rPr lang="en-US" dirty="0"/>
+              <a:t>: normalized width of bounding box</a:t>
+            </a:r>
+          </a:p>
+          <a:p>
+            <a:pPr>
+              <a:lnSpc>
+                <a:spcPct val="130000"/>
+              </a:lnSpc>
+            </a:pPr>
+            <a:r>
+              <a:rPr lang="en-US" dirty="0">
+                <a:latin typeface="Courier New" panose="02070309020205020404" pitchFamily="49" charset="0"/>
+                <a:cs typeface="Courier New" panose="02070309020205020404" pitchFamily="49" charset="0"/>
+              </a:rPr>
+              <a:t>h</a:t>
+            </a:r>
+            <a:r>
+              <a:rPr lang="en-US" dirty="0"/>
+              <a:t>: normalized height of bounding box</a:t>
+            </a:r>
+          </a:p>
+          <a:p>
+            <a:pPr>
+              <a:lnSpc>
+                <a:spcPct val="130000"/>
+              </a:lnSpc>
+            </a:pPr>
+            <a:endParaRPr lang="en-US" dirty="0"/>
+          </a:p>
+          <a:p>
+            <a:pPr>
+              <a:lnSpc>
+                <a:spcPct val="130000"/>
+              </a:lnSpc>
+            </a:pPr>
+            <a:r>
+              <a:rPr lang="en-US" dirty="0"/>
+              <a:t>All coordinates are normalized, thus independent to actual image resolution</a:t>
+            </a:r>
+          </a:p>
+          <a:p>
+            <a:pPr>
+              <a:lnSpc>
+                <a:spcPct val="130000"/>
+              </a:lnSpc>
+            </a:pPr>
+            <a:endParaRPr lang="en-US" dirty="0"/>
+          </a:p>
+          <a:p>
+            <a:pPr>
+              <a:lnSpc>
+                <a:spcPct val="130000"/>
+              </a:lnSpc>
+            </a:pPr>
+            <a:r>
+              <a:rPr lang="en-US" b="1" dirty="0"/>
+              <a:t>Target</a:t>
+            </a:r>
+            <a:r>
+              <a:rPr lang="en-US" dirty="0"/>
+              <a:t> for loss calculation: [</a:t>
+            </a:r>
+            <a:r>
+              <a:rPr lang="en-US" dirty="0" err="1"/>
+              <a:t>tx,ty,tw,th</a:t>
+            </a:r>
+            <a:r>
+              <a:rPr lang="en-US" dirty="0"/>
+              <a:t>] where </a:t>
+            </a:r>
+            <a:r>
+              <a:rPr lang="en-US" dirty="0" err="1"/>
+              <a:t>tx</a:t>
+            </a:r>
+            <a:r>
+              <a:rPr lang="en-US" dirty="0"/>
+              <a:t> and ty is the offset of the object’s center inside its grid cell (i.e., from its grid cell top-left index)  and </a:t>
+            </a:r>
+            <a:r>
+              <a:rPr lang="en-US" dirty="0" err="1"/>
+              <a:t>tw</a:t>
+            </a:r>
+            <a:r>
+              <a:rPr lang="en-US" dirty="0"/>
+              <a:t> and </a:t>
+            </a:r>
+            <a:r>
+              <a:rPr lang="en-US" dirty="0" err="1"/>
+              <a:t>th</a:t>
+            </a:r>
+            <a:r>
+              <a:rPr lang="en-US" dirty="0"/>
+              <a:t> is bounding box width/height in grid cell units.  </a:t>
+            </a:r>
+          </a:p>
+        </p:txBody>
+      </p:sp>
+    </p:spTree>
+    <p:extLst>
+      <p:ext uri="{BB962C8B-B14F-4D97-AF65-F5344CB8AC3E}">
+        <p14:creationId xmlns:p14="http://schemas.microsoft.com/office/powerpoint/2010/main" val="1115603365"/>
+      </p:ext>
+    </p:extLst>
+  </p:cSld>
+  <p:clrMapOvr>
+    <a:masterClrMapping/>
+  </p:clrMapOvr>
+</p:sld>
+</file>
+
+<file path=ppt/slides/slide16.xml><?xml version="1.0" encoding="utf-8"?>
+<p:sld xmlns:a="http://schemas.openxmlformats.org/drawingml/2006/main" xmlns:r="http://schemas.openxmlformats.org/officeDocument/2006/relationships" xmlns:p="http://schemas.openxmlformats.org/presentationml/2006/main">
+  <p:cSld>
+    <p:spTree>
+      <p:nvGrpSpPr>
+        <p:cNvPr id="1" name="">
+          <a:extLst>
+            <a:ext uri="{FF2B5EF4-FFF2-40B4-BE49-F238E27FC236}">
+              <a16:creationId xmlns:a16="http://schemas.microsoft.com/office/drawing/2014/main" id="{2CA7D920-1B06-4E5C-8401-CF7A0720564B}"/>
+            </a:ext>
+          </a:extLst>
+        </p:cNvPr>
+        <p:cNvGrpSpPr/>
+        <p:nvPr/>
+      </p:nvGrpSpPr>
+      <p:grpSpPr>
+        <a:xfrm>
+          <a:off x="0" y="0"/>
+          <a:ext cx="0" cy="0"/>
+          <a:chOff x="0" y="0"/>
+          <a:chExt cx="0" cy="0"/>
+        </a:xfrm>
+      </p:grpSpPr>
+      <p:sp>
+        <p:nvSpPr>
+          <p:cNvPr id="4" name="TextBox 3">
+            <a:extLst>
+              <a:ext uri="{FF2B5EF4-FFF2-40B4-BE49-F238E27FC236}">
+                <a16:creationId xmlns:a16="http://schemas.microsoft.com/office/drawing/2014/main" id="{0B07FF55-8EA2-03B8-BF9F-5DCAF94997D5}"/>
+              </a:ext>
+            </a:extLst>
+          </p:cNvPr>
+          <p:cNvSpPr txBox="1"/>
+          <p:nvPr/>
+        </p:nvSpPr>
+        <p:spPr>
+          <a:xfrm>
+            <a:off x="508000" y="462103"/>
+            <a:ext cx="9613900" cy="523220"/>
+          </a:xfrm>
+          <a:prstGeom prst="rect">
+            <a:avLst/>
+          </a:prstGeom>
+          <a:noFill/>
+        </p:spPr>
+        <p:txBody>
+          <a:bodyPr wrap="square" rtlCol="0">
+            <a:spAutoFit/>
+          </a:bodyPr>
+          <a:lstStyle/>
+          <a:p>
+            <a:r>
+              <a:rPr lang="en-US" sz="2800" b="1" dirty="0"/>
+              <a:t>Output</a:t>
+            </a:r>
+          </a:p>
+        </p:txBody>
+      </p:sp>
+      <mc:AlternateContent xmlns:mc="http://schemas.openxmlformats.org/markup-compatibility/2006">
+        <mc:Choice xmlns:a14="http://schemas.microsoft.com/office/drawing/2010/main" Requires="a14">
+          <p:sp>
+            <p:nvSpPr>
+              <p:cNvPr id="5" name="TextBox 4">
+                <a:extLst>
+                  <a:ext uri="{FF2B5EF4-FFF2-40B4-BE49-F238E27FC236}">
+                    <a16:creationId xmlns:a16="http://schemas.microsoft.com/office/drawing/2014/main" id="{C4D9F111-FE31-C57D-5208-EE025287AA39}"/>
+                  </a:ext>
+                </a:extLst>
+              </p:cNvPr>
+              <p:cNvSpPr txBox="1"/>
+              <p:nvPr/>
+            </p:nvSpPr>
+            <p:spPr>
+              <a:xfrm>
+                <a:off x="635000" y="1201837"/>
+                <a:ext cx="10922000" cy="3160289"/>
+              </a:xfrm>
+              <a:prstGeom prst="rect">
+                <a:avLst/>
+              </a:prstGeom>
+              <a:noFill/>
+            </p:spPr>
+            <p:txBody>
+              <a:bodyPr wrap="square" rtlCol="0">
+                <a:spAutoFit/>
+              </a:bodyPr>
+              <a:lstStyle/>
+              <a:p>
+                <a:pPr>
+                  <a:lnSpc>
+                    <a:spcPct val="140000"/>
+                  </a:lnSpc>
+                </a:pPr>
+                <a:r>
+                  <a:rPr lang="en-US" dirty="0"/>
+                  <a:t>yolov7 returns </a:t>
+                </a:r>
+                <a:r>
+                  <a:rPr lang="en-US" b="1" dirty="0"/>
+                  <a:t>output per levels </a:t>
+                </a:r>
+                <a:r>
+                  <a:rPr lang="en-US" dirty="0"/>
+                  <a:t>of the </a:t>
+                </a:r>
+                <a:r>
+                  <a:rPr lang="en-US" b="1" dirty="0"/>
+                  <a:t>main head </a:t>
+                </a:r>
+                <a:r>
+                  <a:rPr lang="en-US" dirty="0"/>
+                  <a:t>and followed by the output per level of </a:t>
+                </a:r>
+                <a:r>
+                  <a:rPr lang="en-US" b="1" dirty="0"/>
+                  <a:t>axillary head</a:t>
+                </a:r>
+                <a:r>
+                  <a:rPr lang="en-US" dirty="0"/>
+                  <a:t>. Each output is of size </a:t>
+                </a:r>
+                <a:r>
+                  <a:rPr lang="en-US" dirty="0" err="1"/>
+                  <a:t>BxAxHxWxO</a:t>
+                </a:r>
+                <a:r>
+                  <a:rPr lang="en-US" dirty="0"/>
+                  <a:t> where A is the number of anchors and O is the output dimension storing </a:t>
+                </a:r>
+              </a:p>
+              <a:p>
+                <a:pPr>
+                  <a:lnSpc>
+                    <a:spcPct val="140000"/>
+                  </a:lnSpc>
+                </a:pPr>
+                <a14:m>
+                  <m:oMathPara xmlns:m="http://schemas.openxmlformats.org/officeDocument/2006/math">
+                    <m:oMathParaPr>
+                      <m:jc m:val="centerGroup"/>
+                    </m:oMathParaPr>
+                    <m:oMath xmlns:m="http://schemas.openxmlformats.org/officeDocument/2006/math">
+                      <m:sSubSup>
+                        <m:sSubSupPr>
+                          <m:ctrlPr>
+                            <a:rPr lang="en-US" b="0" i="1" smtClean="0">
+                              <a:latin typeface="Cambria Math" panose="02040503050406030204" pitchFamily="18" charset="0"/>
+                            </a:rPr>
+                          </m:ctrlPr>
+                        </m:sSubSupPr>
+                        <m:e>
+                          <m:r>
+                            <a:rPr lang="en-US" b="0" i="1" smtClean="0">
+                              <a:latin typeface="Cambria Math" panose="02040503050406030204" pitchFamily="18" charset="0"/>
+                            </a:rPr>
+                            <m:t>𝑥</m:t>
+                          </m:r>
+                        </m:e>
+                        <m:sub>
+                          <m:r>
+                            <a:rPr lang="en-US" b="0" i="1" smtClean="0">
+                              <a:latin typeface="Cambria Math" panose="02040503050406030204" pitchFamily="18" charset="0"/>
+                            </a:rPr>
+                            <m:t>𝑐</m:t>
+                          </m:r>
+                        </m:sub>
+                        <m:sup>
+                          <m:r>
+                            <a:rPr lang="en-US" b="0" i="1" smtClean="0">
+                              <a:latin typeface="Cambria Math" panose="02040503050406030204" pitchFamily="18" charset="0"/>
+                            </a:rPr>
+                            <m:t>′</m:t>
+                          </m:r>
+                        </m:sup>
+                      </m:sSubSup>
+                      <m:r>
+                        <a:rPr lang="en-US" b="0" i="1" smtClean="0">
+                          <a:latin typeface="Cambria Math" panose="02040503050406030204" pitchFamily="18" charset="0"/>
+                        </a:rPr>
+                        <m:t>, </m:t>
+                      </m:r>
+                      <m:sSubSup>
+                        <m:sSubSupPr>
+                          <m:ctrlPr>
+                            <a:rPr lang="en-US" b="0" i="1" smtClean="0">
+                              <a:latin typeface="Cambria Math" panose="02040503050406030204" pitchFamily="18" charset="0"/>
+                            </a:rPr>
+                          </m:ctrlPr>
+                        </m:sSubSupPr>
+                        <m:e>
+                          <m:r>
+                            <a:rPr lang="en-US" b="0" i="1" smtClean="0">
+                              <a:latin typeface="Cambria Math" panose="02040503050406030204" pitchFamily="18" charset="0"/>
+                            </a:rPr>
+                            <m:t>𝑦</m:t>
+                          </m:r>
+                        </m:e>
+                        <m:sub>
+                          <m:r>
+                            <a:rPr lang="en-US" b="0" i="1" smtClean="0">
+                              <a:latin typeface="Cambria Math" panose="02040503050406030204" pitchFamily="18" charset="0"/>
+                            </a:rPr>
+                            <m:t>𝑐</m:t>
+                          </m:r>
+                        </m:sub>
+                        <m:sup>
+                          <m:r>
+                            <a:rPr lang="en-US" b="0" i="1" smtClean="0">
+                              <a:latin typeface="Cambria Math" panose="02040503050406030204" pitchFamily="18" charset="0"/>
+                            </a:rPr>
+                            <m:t>′</m:t>
+                          </m:r>
+                        </m:sup>
+                      </m:sSubSup>
+                      <m:r>
+                        <a:rPr lang="en-US" b="0" i="1" smtClean="0">
+                          <a:latin typeface="Cambria Math" panose="02040503050406030204" pitchFamily="18" charset="0"/>
+                        </a:rPr>
+                        <m:t>, </m:t>
+                      </m:r>
+                      <m:sSup>
+                        <m:sSupPr>
+                          <m:ctrlPr>
+                            <a:rPr lang="en-US" b="0" i="1" smtClean="0">
+                              <a:latin typeface="Cambria Math" panose="02040503050406030204" pitchFamily="18" charset="0"/>
+                            </a:rPr>
+                          </m:ctrlPr>
+                        </m:sSupPr>
+                        <m:e>
+                          <m:r>
+                            <a:rPr lang="en-US" b="0" i="1" smtClean="0">
+                              <a:latin typeface="Cambria Math" panose="02040503050406030204" pitchFamily="18" charset="0"/>
+                            </a:rPr>
+                            <m:t>𝑤</m:t>
+                          </m:r>
+                        </m:e>
+                        <m:sup>
+                          <m:r>
+                            <a:rPr lang="en-US" b="0" i="1" smtClean="0">
+                              <a:latin typeface="Cambria Math" panose="02040503050406030204" pitchFamily="18" charset="0"/>
+                            </a:rPr>
+                            <m:t>′</m:t>
+                          </m:r>
+                        </m:sup>
+                      </m:sSup>
+                      <m:r>
+                        <a:rPr lang="en-US" b="0" i="1" smtClean="0">
+                          <a:latin typeface="Cambria Math" panose="02040503050406030204" pitchFamily="18" charset="0"/>
+                        </a:rPr>
+                        <m:t>, </m:t>
+                      </m:r>
+                      <m:sSup>
+                        <m:sSupPr>
+                          <m:ctrlPr>
+                            <a:rPr lang="en-US" b="0" i="1" smtClean="0">
+                              <a:latin typeface="Cambria Math" panose="02040503050406030204" pitchFamily="18" charset="0"/>
+                            </a:rPr>
+                          </m:ctrlPr>
+                        </m:sSupPr>
+                        <m:e>
+                          <m:r>
+                            <a:rPr lang="en-US" b="0" i="1" smtClean="0">
+                              <a:latin typeface="Cambria Math" panose="02040503050406030204" pitchFamily="18" charset="0"/>
+                            </a:rPr>
+                            <m:t>h</m:t>
+                          </m:r>
+                        </m:e>
+                        <m:sup>
+                          <m:r>
+                            <a:rPr lang="en-US" b="0" i="1" smtClean="0">
+                              <a:latin typeface="Cambria Math" panose="02040503050406030204" pitchFamily="18" charset="0"/>
+                            </a:rPr>
+                            <m:t>′</m:t>
+                          </m:r>
+                        </m:sup>
+                      </m:sSup>
+                      <m:r>
+                        <a:rPr lang="en-US" b="0" i="1" smtClean="0">
+                          <a:latin typeface="Cambria Math" panose="02040503050406030204" pitchFamily="18" charset="0"/>
+                        </a:rPr>
+                        <m:t>,</m:t>
+                      </m:r>
+                      <m:r>
+                        <a:rPr lang="en-US" b="0" i="1" smtClean="0">
+                          <a:latin typeface="Cambria Math" panose="02040503050406030204" pitchFamily="18" charset="0"/>
+                        </a:rPr>
+                        <m:t>𝑜𝑏𝑗</m:t>
+                      </m:r>
+                      <m:r>
+                        <a:rPr lang="en-US" b="0" i="1" smtClean="0">
+                          <a:latin typeface="Cambria Math" panose="02040503050406030204" pitchFamily="18" charset="0"/>
+                        </a:rPr>
+                        <m:t>′, </m:t>
+                      </m:r>
+                      <m:r>
+                        <a:rPr lang="en-US" b="0" i="1" smtClean="0">
+                          <a:latin typeface="Cambria Math" panose="02040503050406030204" pitchFamily="18" charset="0"/>
+                        </a:rPr>
+                        <m:t>𝑐𝑙𝑎𝑠</m:t>
+                      </m:r>
+                      <m:sSub>
+                        <m:sSubPr>
+                          <m:ctrlPr>
+                            <a:rPr lang="en-US" b="0" i="1" smtClean="0">
+                              <a:latin typeface="Cambria Math" panose="02040503050406030204" pitchFamily="18" charset="0"/>
+                            </a:rPr>
+                          </m:ctrlPr>
+                        </m:sSubPr>
+                        <m:e>
+                          <m:r>
+                            <a:rPr lang="en-US" b="0" i="1" smtClean="0">
+                              <a:latin typeface="Cambria Math" panose="02040503050406030204" pitchFamily="18" charset="0"/>
+                            </a:rPr>
+                            <m:t>𝑠</m:t>
+                          </m:r>
+                        </m:e>
+                        <m:sub>
+                          <m:r>
+                            <a:rPr lang="en-US" b="0" i="1" smtClean="0">
+                              <a:latin typeface="Cambria Math" panose="02040503050406030204" pitchFamily="18" charset="0"/>
+                            </a:rPr>
+                            <m:t>1</m:t>
+                          </m:r>
+                        </m:sub>
+                      </m:sSub>
+                      <m:r>
+                        <a:rPr lang="en-US" b="0" i="1" smtClean="0">
+                          <a:latin typeface="Cambria Math" panose="02040503050406030204" pitchFamily="18" charset="0"/>
+                        </a:rPr>
+                        <m:t>′, …</m:t>
+                      </m:r>
+                      <m:r>
+                        <a:rPr lang="en-US" b="0" i="1" smtClean="0">
+                          <a:latin typeface="Cambria Math" panose="02040503050406030204" pitchFamily="18" charset="0"/>
+                        </a:rPr>
+                        <m:t>𝑐𝑙𝑎𝑠</m:t>
+                      </m:r>
+                      <m:sSub>
+                        <m:sSubPr>
+                          <m:ctrlPr>
+                            <a:rPr lang="en-US" b="0" i="1" smtClean="0">
+                              <a:latin typeface="Cambria Math" panose="02040503050406030204" pitchFamily="18" charset="0"/>
+                            </a:rPr>
+                          </m:ctrlPr>
+                        </m:sSubPr>
+                        <m:e>
+                          <m:r>
+                            <a:rPr lang="en-US" b="0" i="1" smtClean="0">
+                              <a:latin typeface="Cambria Math" panose="02040503050406030204" pitchFamily="18" charset="0"/>
+                            </a:rPr>
+                            <m:t>𝑠</m:t>
+                          </m:r>
+                        </m:e>
+                        <m:sub>
+                          <m:r>
+                            <a:rPr lang="en-US" b="0" i="1" smtClean="0">
+                              <a:latin typeface="Cambria Math" panose="02040503050406030204" pitchFamily="18" charset="0"/>
+                            </a:rPr>
+                            <m:t>𝑛𝑐</m:t>
+                          </m:r>
+                        </m:sub>
+                      </m:sSub>
+                      <m:r>
+                        <a:rPr lang="en-US" b="0" i="1" smtClean="0">
+                          <a:latin typeface="Cambria Math" panose="02040503050406030204" pitchFamily="18" charset="0"/>
+                        </a:rPr>
+                        <m:t>′</m:t>
+                      </m:r>
+                    </m:oMath>
+                  </m:oMathPara>
+                </a14:m>
+                <a:endParaRPr lang="en-US" dirty="0"/>
+              </a:p>
+              <a:p>
+                <a:pPr>
+                  <a:lnSpc>
+                    <a:spcPct val="140000"/>
+                  </a:lnSpc>
+                </a:pPr>
+                <a:r>
+                  <a:rPr lang="en-US" dirty="0"/>
+                  <a:t> where </a:t>
+                </a:r>
+                <a:endParaRPr lang="en-US" b="0" i="1" dirty="0">
+                  <a:latin typeface="Cambria Math" panose="02040503050406030204" pitchFamily="18" charset="0"/>
+                </a:endParaRPr>
+              </a:p>
+              <a:p>
+                <a:pPr>
+                  <a:lnSpc>
+                    <a:spcPct val="140000"/>
+                  </a:lnSpc>
+                </a:pPr>
+                <a14:m>
+                  <m:oMath xmlns:m="http://schemas.openxmlformats.org/officeDocument/2006/math">
+                    <m:sSub>
+                      <m:sSubPr>
+                        <m:ctrlPr>
+                          <a:rPr lang="en-US" b="0" i="1" dirty="0" smtClean="0">
+                            <a:latin typeface="Cambria Math" panose="02040503050406030204" pitchFamily="18" charset="0"/>
+                          </a:rPr>
+                        </m:ctrlPr>
+                      </m:sSubPr>
+                      <m:e>
+                        <m:r>
+                          <a:rPr lang="en-US" i="1" dirty="0" smtClean="0">
+                            <a:latin typeface="Cambria Math" panose="02040503050406030204" pitchFamily="18" charset="0"/>
+                          </a:rPr>
+                          <m:t>𝑥</m:t>
+                        </m:r>
+                      </m:e>
+                      <m:sub>
+                        <m:r>
+                          <a:rPr lang="en-US" b="0" i="1" dirty="0" smtClean="0">
+                            <a:latin typeface="Cambria Math" panose="02040503050406030204" pitchFamily="18" charset="0"/>
+                          </a:rPr>
+                          <m:t>𝑐</m:t>
+                        </m:r>
+                      </m:sub>
+                    </m:sSub>
+                    <m:r>
+                      <a:rPr lang="en-US" b="0" i="1" dirty="0" smtClean="0">
+                        <a:latin typeface="Cambria Math" panose="02040503050406030204" pitchFamily="18" charset="0"/>
+                      </a:rPr>
+                      <m:t>=2</m:t>
+                    </m:r>
+                    <m:r>
+                      <m:rPr>
+                        <m:sty m:val="p"/>
+                      </m:rPr>
+                      <a:rPr lang="en-US" b="0" i="0" dirty="0" smtClean="0">
+                        <a:latin typeface="Cambria Math" panose="02040503050406030204" pitchFamily="18" charset="0"/>
+                      </a:rPr>
+                      <m:t>sigmoid</m:t>
+                    </m:r>
+                    <m:d>
+                      <m:dPr>
+                        <m:ctrlPr>
+                          <a:rPr lang="en-US" b="0" i="1" dirty="0" smtClean="0">
+                            <a:latin typeface="Cambria Math" panose="02040503050406030204" pitchFamily="18" charset="0"/>
+                          </a:rPr>
+                        </m:ctrlPr>
+                      </m:dPr>
+                      <m:e>
+                        <m:sSubSup>
+                          <m:sSubSupPr>
+                            <m:ctrlPr>
+                              <a:rPr lang="en-US" i="1">
+                                <a:latin typeface="Cambria Math" panose="02040503050406030204" pitchFamily="18" charset="0"/>
+                              </a:rPr>
+                            </m:ctrlPr>
+                          </m:sSubSupPr>
+                          <m:e>
+                            <m:r>
+                              <a:rPr lang="en-US" i="1">
+                                <a:latin typeface="Cambria Math" panose="02040503050406030204" pitchFamily="18" charset="0"/>
+                              </a:rPr>
+                              <m:t>𝑥</m:t>
+                            </m:r>
+                          </m:e>
+                          <m:sub>
+                            <m:r>
+                              <a:rPr lang="en-US" i="1">
+                                <a:latin typeface="Cambria Math" panose="02040503050406030204" pitchFamily="18" charset="0"/>
+                              </a:rPr>
+                              <m:t>𝑐</m:t>
+                            </m:r>
+                          </m:sub>
+                          <m:sup>
+                            <m:r>
+                              <a:rPr lang="en-US" i="1">
+                                <a:latin typeface="Cambria Math" panose="02040503050406030204" pitchFamily="18" charset="0"/>
+                              </a:rPr>
+                              <m:t>′</m:t>
+                            </m:r>
+                          </m:sup>
+                        </m:sSubSup>
+                      </m:e>
+                    </m:d>
+                    <m:r>
+                      <a:rPr lang="en-US" b="0" i="1" smtClean="0">
+                        <a:latin typeface="Cambria Math" panose="02040503050406030204" pitchFamily="18" charset="0"/>
+                      </a:rPr>
+                      <m:t>−0.5</m:t>
+                    </m:r>
+                  </m:oMath>
+                </a14:m>
+                <a:r>
+                  <a:rPr lang="en-US" dirty="0"/>
+                  <a:t> is the offset from the grid center in feature-grid cell unit</a:t>
+                </a:r>
+              </a:p>
+              <a:p>
+                <a:pPr>
+                  <a:lnSpc>
+                    <a:spcPct val="140000"/>
+                  </a:lnSpc>
+                </a:pPr>
+                <a:r>
+                  <a:rPr lang="en-US" dirty="0"/>
+                  <a:t> </a:t>
+                </a:r>
+                <a14:m>
+                  <m:oMath xmlns:m="http://schemas.openxmlformats.org/officeDocument/2006/math">
+                    <m:sSub>
+                      <m:sSubPr>
+                        <m:ctrlPr>
+                          <a:rPr lang="en-US" i="1" dirty="0">
+                            <a:latin typeface="Cambria Math" panose="02040503050406030204" pitchFamily="18" charset="0"/>
+                          </a:rPr>
+                        </m:ctrlPr>
+                      </m:sSubPr>
+                      <m:e>
+                        <m:r>
+                          <a:rPr lang="en-US" b="0" i="1" dirty="0" smtClean="0">
+                            <a:latin typeface="Cambria Math" panose="02040503050406030204" pitchFamily="18" charset="0"/>
+                          </a:rPr>
+                          <m:t>𝑦</m:t>
+                        </m:r>
+                      </m:e>
+                      <m:sub>
+                        <m:r>
+                          <a:rPr lang="en-US" i="1" dirty="0">
+                            <a:latin typeface="Cambria Math" panose="02040503050406030204" pitchFamily="18" charset="0"/>
+                          </a:rPr>
+                          <m:t>𝑐</m:t>
+                        </m:r>
+                      </m:sub>
+                    </m:sSub>
+                    <m:r>
+                      <a:rPr lang="en-US" i="1" dirty="0">
+                        <a:latin typeface="Cambria Math" panose="02040503050406030204" pitchFamily="18" charset="0"/>
+                      </a:rPr>
+                      <m:t>=2</m:t>
+                    </m:r>
+                    <m:r>
+                      <m:rPr>
+                        <m:sty m:val="p"/>
+                      </m:rPr>
+                      <a:rPr lang="en-US" dirty="0">
+                        <a:latin typeface="Cambria Math" panose="02040503050406030204" pitchFamily="18" charset="0"/>
+                      </a:rPr>
+                      <m:t>sigmoid</m:t>
+                    </m:r>
+                    <m:d>
+                      <m:dPr>
+                        <m:ctrlPr>
+                          <a:rPr lang="en-US" i="1" dirty="0">
+                            <a:latin typeface="Cambria Math" panose="02040503050406030204" pitchFamily="18" charset="0"/>
+                          </a:rPr>
+                        </m:ctrlPr>
+                      </m:dPr>
+                      <m:e>
+                        <m:sSubSup>
+                          <m:sSubSupPr>
+                            <m:ctrlPr>
+                              <a:rPr lang="en-US" i="1">
+                                <a:latin typeface="Cambria Math" panose="02040503050406030204" pitchFamily="18" charset="0"/>
+                              </a:rPr>
+                            </m:ctrlPr>
+                          </m:sSubSupPr>
+                          <m:e>
+                            <m:r>
+                              <a:rPr lang="en-US" b="0" i="1" smtClean="0">
+                                <a:latin typeface="Cambria Math" panose="02040503050406030204" pitchFamily="18" charset="0"/>
+                              </a:rPr>
+                              <m:t>𝑦</m:t>
+                            </m:r>
+                          </m:e>
+                          <m:sub>
+                            <m:r>
+                              <a:rPr lang="en-US" i="1">
+                                <a:latin typeface="Cambria Math" panose="02040503050406030204" pitchFamily="18" charset="0"/>
+                              </a:rPr>
+                              <m:t>𝑐</m:t>
+                            </m:r>
+                          </m:sub>
+                          <m:sup>
+                            <m:r>
+                              <a:rPr lang="en-US" i="1">
+                                <a:latin typeface="Cambria Math" panose="02040503050406030204" pitchFamily="18" charset="0"/>
+                              </a:rPr>
+                              <m:t>′</m:t>
+                            </m:r>
+                          </m:sup>
+                        </m:sSubSup>
+                      </m:e>
+                    </m:d>
+                    <m:r>
+                      <a:rPr lang="en-US" i="1">
+                        <a:latin typeface="Cambria Math" panose="02040503050406030204" pitchFamily="18" charset="0"/>
+                      </a:rPr>
+                      <m:t>−0.5</m:t>
+                    </m:r>
+                  </m:oMath>
+                </a14:m>
+                <a:r>
+                  <a:rPr lang="en-US" dirty="0"/>
+                  <a:t> is the offset from the grid center in feature-grid cell unit.</a:t>
+                </a:r>
+              </a:p>
+              <a:p>
+                <a:pPr>
+                  <a:lnSpc>
+                    <a:spcPct val="140000"/>
+                  </a:lnSpc>
+                </a:pPr>
+                <a14:m>
+                  <m:oMath xmlns:m="http://schemas.openxmlformats.org/officeDocument/2006/math">
+                    <m:r>
+                      <a:rPr lang="en-US" i="1">
+                        <a:latin typeface="Cambria Math" panose="02040503050406030204" pitchFamily="18" charset="0"/>
+                      </a:rPr>
+                      <m:t>𝑜𝑏𝑗</m:t>
+                    </m:r>
+                    <m:r>
+                      <a:rPr lang="en-US" b="0" i="1" smtClean="0">
+                        <a:latin typeface="Cambria Math" panose="02040503050406030204" pitchFamily="18" charset="0"/>
+                      </a:rPr>
+                      <m:t>=</m:t>
+                    </m:r>
+                    <m:r>
+                      <m:rPr>
+                        <m:sty m:val="p"/>
+                      </m:rPr>
+                      <a:rPr lang="en-US" b="0" i="0" smtClean="0">
+                        <a:latin typeface="Cambria Math" panose="02040503050406030204" pitchFamily="18" charset="0"/>
+                      </a:rPr>
+                      <m:t>sigmoid</m:t>
+                    </m:r>
+                    <m:r>
+                      <a:rPr lang="en-US" b="0" i="1" smtClean="0">
+                        <a:latin typeface="Cambria Math" panose="02040503050406030204" pitchFamily="18" charset="0"/>
+                      </a:rPr>
+                      <m:t>(</m:t>
+                    </m:r>
+                    <m:r>
+                      <a:rPr lang="en-US" i="1">
+                        <a:latin typeface="Cambria Math" panose="02040503050406030204" pitchFamily="18" charset="0"/>
+                      </a:rPr>
+                      <m:t>𝑜𝑏𝑗</m:t>
+                    </m:r>
+                    <m:r>
+                      <a:rPr lang="en-US" b="0" i="1" smtClean="0">
+                        <a:latin typeface="Cambria Math" panose="02040503050406030204" pitchFamily="18" charset="0"/>
+                      </a:rPr>
+                      <m:t>)</m:t>
+                    </m:r>
+                  </m:oMath>
+                </a14:m>
+                <a:r>
+                  <a:rPr lang="en-US" dirty="0"/>
+                  <a:t> is </a:t>
+                </a:r>
+                <a:r>
+                  <a:rPr lang="en-US" dirty="0" err="1"/>
+                  <a:t>objectness</a:t>
+                </a:r>
+                <a:r>
+                  <a:rPr lang="en-US" dirty="0"/>
+                  <a:t> probability</a:t>
+                </a:r>
+              </a:p>
+              <a:p>
+                <a:pPr>
+                  <a:lnSpc>
+                    <a:spcPct val="140000"/>
+                  </a:lnSpc>
+                </a:pPr>
+                <a14:m>
+                  <m:oMath xmlns:m="http://schemas.openxmlformats.org/officeDocument/2006/math">
+                    <m:r>
+                      <a:rPr lang="en-US" i="1">
+                        <a:latin typeface="Cambria Math" panose="02040503050406030204" pitchFamily="18" charset="0"/>
+                      </a:rPr>
+                      <m:t>𝑐𝑙𝑎𝑠</m:t>
+                    </m:r>
+                    <m:sSub>
+                      <m:sSubPr>
+                        <m:ctrlPr>
+                          <a:rPr lang="en-US" i="1">
+                            <a:latin typeface="Cambria Math" panose="02040503050406030204" pitchFamily="18" charset="0"/>
+                          </a:rPr>
+                        </m:ctrlPr>
+                      </m:sSubPr>
+                      <m:e>
+                        <m:r>
+                          <a:rPr lang="en-US" i="1">
+                            <a:latin typeface="Cambria Math" panose="02040503050406030204" pitchFamily="18" charset="0"/>
+                          </a:rPr>
+                          <m:t>𝑠</m:t>
+                        </m:r>
+                      </m:e>
+                      <m:sub>
+                        <m:r>
+                          <a:rPr lang="en-US" b="0" i="1" smtClean="0">
+                            <a:latin typeface="Cambria Math" panose="02040503050406030204" pitchFamily="18" charset="0"/>
+                          </a:rPr>
+                          <m:t>𝑖</m:t>
+                        </m:r>
+                      </m:sub>
+                    </m:sSub>
+                    <m:r>
+                      <a:rPr lang="en-US" b="0" i="1" smtClean="0">
+                        <a:latin typeface="Cambria Math" panose="02040503050406030204" pitchFamily="18" charset="0"/>
+                      </a:rPr>
+                      <m:t>=</m:t>
+                    </m:r>
+                    <m:r>
+                      <m:rPr>
+                        <m:sty m:val="p"/>
+                      </m:rPr>
+                      <a:rPr lang="en-US" b="0" i="0" smtClean="0">
+                        <a:latin typeface="Cambria Math" panose="02040503050406030204" pitchFamily="18" charset="0"/>
+                      </a:rPr>
+                      <m:t>sigmoid</m:t>
+                    </m:r>
+                    <m:r>
+                      <a:rPr lang="en-US" b="0" i="1" smtClean="0">
+                        <a:latin typeface="Cambria Math" panose="02040503050406030204" pitchFamily="18" charset="0"/>
+                      </a:rPr>
+                      <m:t>(</m:t>
+                    </m:r>
+                    <m:r>
+                      <a:rPr lang="en-US" i="1">
+                        <a:latin typeface="Cambria Math" panose="02040503050406030204" pitchFamily="18" charset="0"/>
+                      </a:rPr>
+                      <m:t>𝑐𝑙𝑎𝑠</m:t>
+                    </m:r>
+                    <m:sSub>
+                      <m:sSubPr>
+                        <m:ctrlPr>
+                          <a:rPr lang="en-US" i="1">
+                            <a:latin typeface="Cambria Math" panose="02040503050406030204" pitchFamily="18" charset="0"/>
+                          </a:rPr>
+                        </m:ctrlPr>
+                      </m:sSubPr>
+                      <m:e>
+                        <m:r>
+                          <a:rPr lang="en-US" i="1">
+                            <a:latin typeface="Cambria Math" panose="02040503050406030204" pitchFamily="18" charset="0"/>
+                          </a:rPr>
+                          <m:t>𝑠</m:t>
+                        </m:r>
+                      </m:e>
+                      <m:sub>
+                        <m:r>
+                          <a:rPr lang="en-US" b="0" i="1" smtClean="0">
+                            <a:latin typeface="Cambria Math" panose="02040503050406030204" pitchFamily="18" charset="0"/>
+                          </a:rPr>
+                          <m:t>𝑖</m:t>
+                        </m:r>
+                      </m:sub>
+                    </m:sSub>
+                    <m:r>
+                      <a:rPr lang="en-US" i="1">
+                        <a:latin typeface="Cambria Math" panose="02040503050406030204" pitchFamily="18" charset="0"/>
+                      </a:rPr>
+                      <m:t>′</m:t>
+                    </m:r>
+                    <m:r>
+                      <a:rPr lang="en-US" b="0" i="1" smtClean="0">
+                        <a:latin typeface="Cambria Math" panose="02040503050406030204" pitchFamily="18" charset="0"/>
+                      </a:rPr>
+                      <m:t>)</m:t>
+                    </m:r>
+                  </m:oMath>
+                </a14:m>
+                <a:r>
+                  <a:rPr lang="en-US" dirty="0"/>
+                  <a:t> is class probability.</a:t>
+                </a:r>
+              </a:p>
+            </p:txBody>
+          </p:sp>
+        </mc:Choice>
+        <mc:Fallback>
+          <p:sp>
+            <p:nvSpPr>
+              <p:cNvPr id="5" name="TextBox 4">
+                <a:extLst>
+                  <a:ext uri="{FF2B5EF4-FFF2-40B4-BE49-F238E27FC236}">
+                    <a16:creationId xmlns:a16="http://schemas.microsoft.com/office/drawing/2014/main" id="{C4D9F111-FE31-C57D-5208-EE025287AA39}"/>
+                  </a:ext>
+                </a:extLst>
+              </p:cNvPr>
+              <p:cNvSpPr txBox="1">
+                <a:spLocks noRot="1" noChangeAspect="1" noMove="1" noResize="1" noEditPoints="1" noAdjustHandles="1" noChangeArrowheads="1" noChangeShapeType="1" noTextEdit="1"/>
+              </p:cNvSpPr>
+              <p:nvPr/>
+            </p:nvSpPr>
+            <p:spPr>
+              <a:xfrm>
+                <a:off x="635000" y="1201837"/>
+                <a:ext cx="10922000" cy="3160289"/>
+              </a:xfrm>
+              <a:prstGeom prst="rect">
+                <a:avLst/>
+              </a:prstGeom>
+              <a:blipFill>
+                <a:blip r:embed="rId2"/>
+                <a:stretch>
+                  <a:fillRect l="-446" r="-279" b="-2119"/>
+                </a:stretch>
+              </a:blipFill>
+            </p:spPr>
+            <p:txBody>
+              <a:bodyPr/>
+              <a:lstStyle/>
+              <a:p>
+                <a:r>
+                  <a:rPr lang="en-US">
+                    <a:noFill/>
+                  </a:rPr>
+                  <a:t> </a:t>
+                </a:r>
+              </a:p>
+            </p:txBody>
+          </p:sp>
+        </mc:Fallback>
+      </mc:AlternateContent>
+    </p:spTree>
+    <p:extLst>
+      <p:ext uri="{BB962C8B-B14F-4D97-AF65-F5344CB8AC3E}">
+        <p14:creationId xmlns:p14="http://schemas.microsoft.com/office/powerpoint/2010/main" val="826961998"/>
+      </p:ext>
+    </p:extLst>
+  </p:cSld>
+  <p:clrMapOvr>
+    <a:masterClrMapping/>
+  </p:clrMapOvr>
+</p:sld>
+</file>
+
 <file path=ppt/slides/slide2.xml><?xml version="1.0" encoding="utf-8"?>
 <p:sld xmlns:a="http://schemas.openxmlformats.org/drawingml/2006/main" xmlns:r="http://schemas.openxmlformats.org/officeDocument/2006/relationships" xmlns:p="http://schemas.openxmlformats.org/presentationml/2006/main">
   <p:cSld>
@@ -24112,8 +25364,8 @@
           </a:p>
         </p:txBody>
       </p:sp>
-      <mc:AlternateContent xmlns:mc="http://schemas.openxmlformats.org/markup-compatibility/2006">
-        <mc:Choice xmlns:a14="http://schemas.microsoft.com/office/drawing/2010/main" Requires="a14">
+      <mc:AlternateContent xmlns:mc="http://schemas.openxmlformats.org/markup-compatibility/2006" xmlns:a14="http://schemas.microsoft.com/office/drawing/2010/main">
+        <mc:Choice Requires="a14">
           <p:sp>
             <p:nvSpPr>
               <p:cNvPr id="7" name="TextBox 6">
@@ -24332,13 +25584,7 @@
                       <a:rPr lang="en-US" b="0" i="1" smtClean="0">
                         <a:latin typeface="Cambria Math" panose="02040503050406030204" pitchFamily="18" charset="0"/>
                       </a:rPr>
-                      <m:t>+</m:t>
-                    </m:r>
-                    <m:r>
-                      <a:rPr lang="en-US" b="0" i="1" smtClean="0">
-                        <a:latin typeface="Cambria Math" panose="02040503050406030204" pitchFamily="18" charset="0"/>
-                      </a:rPr>
-                      <m:t>=</m:t>
+                      <m:t>+=</m:t>
                     </m:r>
                     <m:func>
                       <m:funcPr>
@@ -24713,7 +25959,7 @@
             </p:txBody>
           </p:sp>
         </mc:Choice>
-        <mc:Fallback>
+        <mc:Fallback xmlns="">
           <p:sp>
             <p:nvSpPr>
               <p:cNvPr id="7" name="TextBox 6">

</xml_diff>

<commit_message>
dev: yolov7/loss/module.py: understanding loss module
</commit_message>
<xml_diff>
--- a/yolov7/doc/networks.pptx
+++ b/yolov7/doc/networks.pptx
@@ -274,7 +274,7 @@
           <a:p>
             <a:fld id="{D8F2F205-24F8-4489-8B05-D7769DC60EDD}" type="datetimeFigureOut">
               <a:rPr lang="en-US" smtClean="0"/>
-              <a:t>9/17/2025</a:t>
+              <a:t>9/18/2025</a:t>
             </a:fld>
             <a:endParaRPr lang="en-US"/>
           </a:p>
@@ -472,7 +472,7 @@
           <a:p>
             <a:fld id="{D8F2F205-24F8-4489-8B05-D7769DC60EDD}" type="datetimeFigureOut">
               <a:rPr lang="en-US" smtClean="0"/>
-              <a:t>9/17/2025</a:t>
+              <a:t>9/18/2025</a:t>
             </a:fld>
             <a:endParaRPr lang="en-US"/>
           </a:p>
@@ -680,7 +680,7 @@
           <a:p>
             <a:fld id="{D8F2F205-24F8-4489-8B05-D7769DC60EDD}" type="datetimeFigureOut">
               <a:rPr lang="en-US" smtClean="0"/>
-              <a:t>9/17/2025</a:t>
+              <a:t>9/18/2025</a:t>
             </a:fld>
             <a:endParaRPr lang="en-US"/>
           </a:p>
@@ -878,7 +878,7 @@
           <a:p>
             <a:fld id="{D8F2F205-24F8-4489-8B05-D7769DC60EDD}" type="datetimeFigureOut">
               <a:rPr lang="en-US" smtClean="0"/>
-              <a:t>9/17/2025</a:t>
+              <a:t>9/18/2025</a:t>
             </a:fld>
             <a:endParaRPr lang="en-US"/>
           </a:p>
@@ -1153,7 +1153,7 @@
           <a:p>
             <a:fld id="{D8F2F205-24F8-4489-8B05-D7769DC60EDD}" type="datetimeFigureOut">
               <a:rPr lang="en-US" smtClean="0"/>
-              <a:t>9/17/2025</a:t>
+              <a:t>9/18/2025</a:t>
             </a:fld>
             <a:endParaRPr lang="en-US"/>
           </a:p>
@@ -1418,7 +1418,7 @@
           <a:p>
             <a:fld id="{D8F2F205-24F8-4489-8B05-D7769DC60EDD}" type="datetimeFigureOut">
               <a:rPr lang="en-US" smtClean="0"/>
-              <a:t>9/17/2025</a:t>
+              <a:t>9/18/2025</a:t>
             </a:fld>
             <a:endParaRPr lang="en-US"/>
           </a:p>
@@ -1830,7 +1830,7 @@
           <a:p>
             <a:fld id="{D8F2F205-24F8-4489-8B05-D7769DC60EDD}" type="datetimeFigureOut">
               <a:rPr lang="en-US" smtClean="0"/>
-              <a:t>9/17/2025</a:t>
+              <a:t>9/18/2025</a:t>
             </a:fld>
             <a:endParaRPr lang="en-US"/>
           </a:p>
@@ -1971,7 +1971,7 @@
           <a:p>
             <a:fld id="{D8F2F205-24F8-4489-8B05-D7769DC60EDD}" type="datetimeFigureOut">
               <a:rPr lang="en-US" smtClean="0"/>
-              <a:t>9/17/2025</a:t>
+              <a:t>9/18/2025</a:t>
             </a:fld>
             <a:endParaRPr lang="en-US"/>
           </a:p>
@@ -2084,7 +2084,7 @@
           <a:p>
             <a:fld id="{D8F2F205-24F8-4489-8B05-D7769DC60EDD}" type="datetimeFigureOut">
               <a:rPr lang="en-US" smtClean="0"/>
-              <a:t>9/17/2025</a:t>
+              <a:t>9/18/2025</a:t>
             </a:fld>
             <a:endParaRPr lang="en-US"/>
           </a:p>
@@ -2395,7 +2395,7 @@
           <a:p>
             <a:fld id="{D8F2F205-24F8-4489-8B05-D7769DC60EDD}" type="datetimeFigureOut">
               <a:rPr lang="en-US" smtClean="0"/>
-              <a:t>9/17/2025</a:t>
+              <a:t>9/18/2025</a:t>
             </a:fld>
             <a:endParaRPr lang="en-US"/>
           </a:p>
@@ -2683,7 +2683,7 @@
           <a:p>
             <a:fld id="{D8F2F205-24F8-4489-8B05-D7769DC60EDD}" type="datetimeFigureOut">
               <a:rPr lang="en-US" smtClean="0"/>
-              <a:t>9/17/2025</a:t>
+              <a:t>9/18/2025</a:t>
             </a:fld>
             <a:endParaRPr lang="en-US"/>
           </a:p>
@@ -2924,7 +2924,7 @@
           <a:p>
             <a:fld id="{D8F2F205-24F8-4489-8B05-D7769DC60EDD}" type="datetimeFigureOut">
               <a:rPr lang="en-US" smtClean="0"/>
-              <a:t>9/17/2025</a:t>
+              <a:t>9/18/2025</a:t>
             </a:fld>
             <a:endParaRPr lang="en-US"/>
           </a:p>
@@ -15012,7 +15012,7 @@
             <p:spPr>
               <a:xfrm>
                 <a:off x="635000" y="1201837"/>
-                <a:ext cx="10922000" cy="3160289"/>
+                <a:ext cx="10922000" cy="5100692"/>
               </a:xfrm>
               <a:prstGeom prst="rect">
                 <a:avLst/>
@@ -15597,7 +15597,7 @@
                 </a:r>
                 <a:r>
                   <a:rPr lang="en-US" dirty="0"/>
-                  <a:t> probability</a:t>
+                  <a:t> probability, i.e., whether there is any object in the grid cell, independent of classes</a:t>
                 </a:r>
               </a:p>
               <a:p>
@@ -15707,7 +15707,38 @@
                 </a14:m>
                 <a:r>
                   <a:rPr lang="en-US" dirty="0"/>
-                  <a:t> is class probability.</a:t>
+                  <a:t> is class probability, predicting which classes the object belongs to, conditioned on there being an object.</a:t>
+                </a:r>
+              </a:p>
+              <a:p>
+                <a:pPr>
+                  <a:lnSpc>
+                    <a:spcPct val="140000"/>
+                  </a:lnSpc>
+                </a:pPr>
+                <a:r>
+                  <a:rPr lang="en-US" dirty="0" err="1"/>
+                  <a:t>Objectness</a:t>
+                </a:r>
+                <a:r>
+                  <a:rPr lang="en-US" dirty="0"/>
+                  <a:t> and classification are trained independently. In other words, </a:t>
+                </a:r>
+                <a:r>
+                  <a:rPr lang="en-US" dirty="0" err="1"/>
+                  <a:t>objectness</a:t>
+                </a:r>
+                <a:r>
+                  <a:rPr lang="en-US" dirty="0"/>
+                  <a:t> probability is not used in computing classification loss. Classification loss is computed on only positive samples (objects exist) while </a:t>
+                </a:r>
+                <a:r>
+                  <a:rPr lang="en-US" dirty="0" err="1"/>
+                  <a:t>objectness</a:t>
+                </a:r>
+                <a:r>
+                  <a:rPr lang="en-US" dirty="0"/>
+                  <a:t> loss is computed on both positive and negative samples (all anchors)</a:t>
                 </a:r>
               </a:p>
             </p:txBody>
@@ -15731,7 +15762,7 @@
             <p:spPr>
               <a:xfrm>
                 <a:off x="635000" y="1201837"/>
-                <a:ext cx="10922000" cy="3160289"/>
+                <a:ext cx="10922000" cy="5100692"/>
               </a:xfrm>
               <a:prstGeom prst="rect">
                 <a:avLst/>
@@ -15739,7 +15770,7 @@
               <a:blipFill>
                 <a:blip r:embed="rId2"/>
                 <a:stretch>
-                  <a:fillRect l="-446" r="-279" b="-2119"/>
+                  <a:fillRect l="-446" r="-279" b="-956"/>
                 </a:stretch>
               </a:blipFill>
             </p:spPr>

</xml_diff>